<commit_message>
Rebuild pages at c5284a72267071bfef7e237d6c2bad519b3eb0a5
</commit_message>
<xml_diff>
--- a/images/UGUI.pptx
+++ b/images/UGUI.pptx
@@ -104,6 +104,11 @@
       </a:defRPr>
     </a:lvl9pPr>
   </p:defaultTextStyle>
+  <p:extLst>
+    <p:ext uri="{EFAFB233-063F-42B5-8137-9DF3F51BA10A}">
+      <p15:sldGuideLst xmlns:p15="http://schemas.microsoft.com/office/powerpoint/2012/main"/>
+    </p:ext>
+  </p:extLst>
 </p:presentation>
 </file>
 
@@ -256,7 +261,7 @@
           <a:p>
             <a:fld id="{796D57E5-7EE7-4A9D-BDF9-E184C54365B2}" type="datetimeFigureOut">
               <a:rPr lang="en-SG" smtClean="0"/>
-              <a:t>29/10/2019</a:t>
+              <a:t>5/11/2019</a:t>
             </a:fld>
             <a:endParaRPr lang="en-SG"/>
           </a:p>
@@ -456,7 +461,7 @@
           <a:p>
             <a:fld id="{796D57E5-7EE7-4A9D-BDF9-E184C54365B2}" type="datetimeFigureOut">
               <a:rPr lang="en-SG" smtClean="0"/>
-              <a:t>29/10/2019</a:t>
+              <a:t>5/11/2019</a:t>
             </a:fld>
             <a:endParaRPr lang="en-SG"/>
           </a:p>
@@ -666,7 +671,7 @@
           <a:p>
             <a:fld id="{796D57E5-7EE7-4A9D-BDF9-E184C54365B2}" type="datetimeFigureOut">
               <a:rPr lang="en-SG" smtClean="0"/>
-              <a:t>29/10/2019</a:t>
+              <a:t>5/11/2019</a:t>
             </a:fld>
             <a:endParaRPr lang="en-SG"/>
           </a:p>
@@ -866,7 +871,7 @@
           <a:p>
             <a:fld id="{796D57E5-7EE7-4A9D-BDF9-E184C54365B2}" type="datetimeFigureOut">
               <a:rPr lang="en-SG" smtClean="0"/>
-              <a:t>29/10/2019</a:t>
+              <a:t>5/11/2019</a:t>
             </a:fld>
             <a:endParaRPr lang="en-SG"/>
           </a:p>
@@ -1142,7 +1147,7 @@
           <a:p>
             <a:fld id="{796D57E5-7EE7-4A9D-BDF9-E184C54365B2}" type="datetimeFigureOut">
               <a:rPr lang="en-SG" smtClean="0"/>
-              <a:t>29/10/2019</a:t>
+              <a:t>5/11/2019</a:t>
             </a:fld>
             <a:endParaRPr lang="en-SG"/>
           </a:p>
@@ -1410,7 +1415,7 @@
           <a:p>
             <a:fld id="{796D57E5-7EE7-4A9D-BDF9-E184C54365B2}" type="datetimeFigureOut">
               <a:rPr lang="en-SG" smtClean="0"/>
-              <a:t>29/10/2019</a:t>
+              <a:t>5/11/2019</a:t>
             </a:fld>
             <a:endParaRPr lang="en-SG"/>
           </a:p>
@@ -1825,7 +1830,7 @@
           <a:p>
             <a:fld id="{796D57E5-7EE7-4A9D-BDF9-E184C54365B2}" type="datetimeFigureOut">
               <a:rPr lang="en-SG" smtClean="0"/>
-              <a:t>29/10/2019</a:t>
+              <a:t>5/11/2019</a:t>
             </a:fld>
             <a:endParaRPr lang="en-SG"/>
           </a:p>
@@ -1967,7 +1972,7 @@
           <a:p>
             <a:fld id="{796D57E5-7EE7-4A9D-BDF9-E184C54365B2}" type="datetimeFigureOut">
               <a:rPr lang="en-SG" smtClean="0"/>
-              <a:t>29/10/2019</a:t>
+              <a:t>5/11/2019</a:t>
             </a:fld>
             <a:endParaRPr lang="en-SG"/>
           </a:p>
@@ -2080,7 +2085,7 @@
           <a:p>
             <a:fld id="{796D57E5-7EE7-4A9D-BDF9-E184C54365B2}" type="datetimeFigureOut">
               <a:rPr lang="en-SG" smtClean="0"/>
-              <a:t>29/10/2019</a:t>
+              <a:t>5/11/2019</a:t>
             </a:fld>
             <a:endParaRPr lang="en-SG"/>
           </a:p>
@@ -2393,7 +2398,7 @@
           <a:p>
             <a:fld id="{796D57E5-7EE7-4A9D-BDF9-E184C54365B2}" type="datetimeFigureOut">
               <a:rPr lang="en-SG" smtClean="0"/>
-              <a:t>29/10/2019</a:t>
+              <a:t>5/11/2019</a:t>
             </a:fld>
             <a:endParaRPr lang="en-SG"/>
           </a:p>
@@ -2682,7 +2687,7 @@
           <a:p>
             <a:fld id="{796D57E5-7EE7-4A9D-BDF9-E184C54365B2}" type="datetimeFigureOut">
               <a:rPr lang="en-SG" smtClean="0"/>
-              <a:t>29/10/2019</a:t>
+              <a:t>5/11/2019</a:t>
             </a:fld>
             <a:endParaRPr lang="en-SG"/>
           </a:p>
@@ -2925,7 +2930,7 @@
           <a:p>
             <a:fld id="{796D57E5-7EE7-4A9D-BDF9-E184C54365B2}" type="datetimeFigureOut">
               <a:rPr lang="en-SG" smtClean="0"/>
-              <a:t>29/10/2019</a:t>
+              <a:t>5/11/2019</a:t>
             </a:fld>
             <a:endParaRPr lang="en-SG"/>
           </a:p>
@@ -3344,10 +3349,10 @@
       </p:grpSpPr>
       <p:grpSp>
         <p:nvGrpSpPr>
-          <p:cNvPr id="31" name="Group 30">
-            <a:extLst>
-              <a:ext uri="{FF2B5EF4-FFF2-40B4-BE49-F238E27FC236}">
-                <a16:creationId xmlns:a16="http://schemas.microsoft.com/office/drawing/2014/main" id="{A3E89F6C-3393-4545-96AB-995DFC0D24CB}"/>
+          <p:cNvPr id="8" name="Group 7">
+            <a:extLst>
+              <a:ext uri="{FF2B5EF4-FFF2-40B4-BE49-F238E27FC236}">
+                <a16:creationId xmlns:a16="http://schemas.microsoft.com/office/drawing/2014/main" id="{F5E5DC95-B5C6-4D60-BA4D-CAD5EF8CB921}"/>
               </a:ext>
             </a:extLst>
           </p:cNvPr>
@@ -3364,10 +3369,10 @@
         </p:grpSpPr>
         <p:pic>
           <p:nvPicPr>
-            <p:cNvPr id="5" name="Picture 4">
+            <p:cNvPr id="3" name="Picture 2">
               <a:extLst>
                 <a:ext uri="{FF2B5EF4-FFF2-40B4-BE49-F238E27FC236}">
-                  <a16:creationId xmlns:a16="http://schemas.microsoft.com/office/drawing/2014/main" id="{787E752A-D032-4994-9018-4B3FF64C8D18}"/>
+                  <a16:creationId xmlns:a16="http://schemas.microsoft.com/office/drawing/2014/main" id="{72EBA724-B63B-498B-B600-45708027B1BC}"/>
                 </a:ext>
               </a:extLst>
             </p:cNvPr>
@@ -3390,1134 +3395,1155 @@
           </p:blipFill>
           <p:spPr>
             <a:xfrm>
-              <a:off x="1816719" y="0"/>
-              <a:ext cx="8558561" cy="6858000"/>
+              <a:off x="1834785" y="0"/>
+              <a:ext cx="8522429" cy="6858000"/>
             </a:xfrm>
             <a:prstGeom prst="rect">
               <a:avLst/>
             </a:prstGeom>
           </p:spPr>
         </p:pic>
-        <p:cxnSp>
-          <p:nvCxnSpPr>
-            <p:cNvPr id="6" name="Straight Arrow Connector 5">
+        <p:grpSp>
+          <p:nvGrpSpPr>
+            <p:cNvPr id="31" name="Group 30">
               <a:extLst>
                 <a:ext uri="{FF2B5EF4-FFF2-40B4-BE49-F238E27FC236}">
-                  <a16:creationId xmlns:a16="http://schemas.microsoft.com/office/drawing/2014/main" id="{95880778-A2D6-4C60-A385-E662BA9B8C78}"/>
+                  <a16:creationId xmlns:a16="http://schemas.microsoft.com/office/drawing/2014/main" id="{A3E89F6C-3393-4545-96AB-995DFC0D24CB}"/>
                 </a:ext>
               </a:extLst>
             </p:cNvPr>
-            <p:cNvCxnSpPr>
-              <a:cxnSpLocks/>
-            </p:cNvCxnSpPr>
+            <p:cNvGrpSpPr/>
             <p:nvPr/>
-          </p:nvCxnSpPr>
-          <p:spPr>
+          </p:nvGrpSpPr>
+          <p:grpSpPr>
             <a:xfrm>
-              <a:off x="1455062" y="768729"/>
-              <a:ext cx="459698" cy="0"/>
+              <a:off x="129428" y="576597"/>
+              <a:ext cx="11757772" cy="5967075"/>
+              <a:chOff x="129428" y="576597"/>
+              <a:chExt cx="11757772" cy="5967075"/>
             </a:xfrm>
-            <a:prstGeom prst="straightConnector1">
-              <a:avLst/>
-            </a:prstGeom>
-            <a:ln>
+          </p:grpSpPr>
+          <p:cxnSp>
+            <p:nvCxnSpPr>
+              <p:cNvPr id="6" name="Straight Arrow Connector 5">
+                <a:extLst>
+                  <a:ext uri="{FF2B5EF4-FFF2-40B4-BE49-F238E27FC236}">
+                    <a16:creationId xmlns:a16="http://schemas.microsoft.com/office/drawing/2014/main" id="{95880778-A2D6-4C60-A385-E662BA9B8C78}"/>
+                  </a:ext>
+                </a:extLst>
+              </p:cNvPr>
+              <p:cNvCxnSpPr>
+                <a:cxnSpLocks/>
+              </p:cNvCxnSpPr>
+              <p:nvPr/>
+            </p:nvCxnSpPr>
+            <p:spPr>
+              <a:xfrm>
+                <a:off x="1455062" y="768729"/>
+                <a:ext cx="459698" cy="0"/>
+              </a:xfrm>
+              <a:prstGeom prst="straightConnector1">
+                <a:avLst/>
+              </a:prstGeom>
+              <a:ln>
+                <a:solidFill>
+                  <a:schemeClr val="tx2"/>
+                </a:solidFill>
+                <a:tailEnd type="triangle"/>
+              </a:ln>
+            </p:spPr>
+            <p:style>
+              <a:lnRef idx="3">
+                <a:schemeClr val="dk1"/>
+              </a:lnRef>
+              <a:fillRef idx="0">
+                <a:schemeClr val="dk1"/>
+              </a:fillRef>
+              <a:effectRef idx="2">
+                <a:schemeClr val="dk1"/>
+              </a:effectRef>
+              <a:fontRef idx="minor">
+                <a:schemeClr val="tx1"/>
+              </a:fontRef>
+            </p:style>
+          </p:cxnSp>
+          <p:sp>
+            <p:nvSpPr>
+              <p:cNvPr id="7" name="Rectangle 6">
+                <a:extLst>
+                  <a:ext uri="{FF2B5EF4-FFF2-40B4-BE49-F238E27FC236}">
+                    <a16:creationId xmlns:a16="http://schemas.microsoft.com/office/drawing/2014/main" id="{87E2B1E6-52E6-4EB7-A323-F2A007F85485}"/>
+                  </a:ext>
+                </a:extLst>
+              </p:cNvPr>
+              <p:cNvSpPr/>
+              <p:nvPr/>
+            </p:nvSpPr>
+            <p:spPr>
+              <a:xfrm>
+                <a:off x="134456" y="576597"/>
+                <a:ext cx="1404095" cy="342897"/>
+              </a:xfrm>
+              <a:prstGeom prst="rect">
+                <a:avLst/>
+              </a:prstGeom>
               <a:solidFill>
                 <a:schemeClr val="tx2"/>
               </a:solidFill>
-              <a:tailEnd type="triangle"/>
-            </a:ln>
-          </p:spPr>
-          <p:style>
-            <a:lnRef idx="3">
-              <a:schemeClr val="dk1"/>
-            </a:lnRef>
-            <a:fillRef idx="0">
-              <a:schemeClr val="dk1"/>
-            </a:fillRef>
-            <a:effectRef idx="2">
-              <a:schemeClr val="dk1"/>
-            </a:effectRef>
-            <a:fontRef idx="minor">
-              <a:schemeClr val="tx1"/>
-            </a:fontRef>
-          </p:style>
-        </p:cxnSp>
-        <p:sp>
-          <p:nvSpPr>
-            <p:cNvPr id="7" name="Rectangle 6">
-              <a:extLst>
-                <a:ext uri="{FF2B5EF4-FFF2-40B4-BE49-F238E27FC236}">
-                  <a16:creationId xmlns:a16="http://schemas.microsoft.com/office/drawing/2014/main" id="{87E2B1E6-52E6-4EB7-A323-F2A007F85485}"/>
-                </a:ext>
-              </a:extLst>
-            </p:cNvPr>
-            <p:cNvSpPr/>
-            <p:nvPr/>
-          </p:nvSpPr>
-          <p:spPr>
-            <a:xfrm>
-              <a:off x="134456" y="576597"/>
-              <a:ext cx="1404095" cy="342897"/>
-            </a:xfrm>
-            <a:prstGeom prst="rect">
-              <a:avLst/>
-            </a:prstGeom>
-            <a:solidFill>
-              <a:schemeClr val="tx2"/>
-            </a:solidFill>
-            <a:ln>
-              <a:noFill/>
-            </a:ln>
-          </p:spPr>
-          <p:style>
-            <a:lnRef idx="2">
-              <a:schemeClr val="accent1">
-                <a:shade val="50000"/>
-              </a:schemeClr>
-            </a:lnRef>
-            <a:fillRef idx="1">
-              <a:schemeClr val="accent1"/>
-            </a:fillRef>
-            <a:effectRef idx="0">
-              <a:schemeClr val="accent1"/>
-            </a:effectRef>
-            <a:fontRef idx="minor">
-              <a:schemeClr val="lt1"/>
-            </a:fontRef>
-          </p:style>
-          <p:txBody>
-            <a:bodyPr rtlCol="0" anchor="ctr"/>
-            <a:lstStyle/>
-            <a:p>
-              <a:pPr algn="ctr"/>
-              <a:r>
-                <a:rPr lang="en-US" sz="1200" dirty="0"/>
-                <a:t>Command Box</a:t>
-              </a:r>
-              <a:endParaRPr lang="en-SG" sz="1200" dirty="0"/>
-            </a:p>
-          </p:txBody>
-        </p:sp>
-        <p:sp>
-          <p:nvSpPr>
-            <p:cNvPr id="10" name="Frame 9">
-              <a:extLst>
-                <a:ext uri="{FF2B5EF4-FFF2-40B4-BE49-F238E27FC236}">
-                  <a16:creationId xmlns:a16="http://schemas.microsoft.com/office/drawing/2014/main" id="{5318FAC7-CBDD-486A-8D8E-BFC9A3AA4AB7}"/>
-                </a:ext>
-              </a:extLst>
-            </p:cNvPr>
-            <p:cNvSpPr/>
-            <p:nvPr/>
-          </p:nvSpPr>
-          <p:spPr>
-            <a:xfrm>
-              <a:off x="1904330" y="1034424"/>
-              <a:ext cx="8383337" cy="775323"/>
-            </a:xfrm>
-            <a:prstGeom prst="frame">
-              <a:avLst>
-                <a:gd name="adj1" fmla="val 2883"/>
-              </a:avLst>
-            </a:prstGeom>
-            <a:solidFill>
-              <a:srgbClr val="FC3737"/>
-            </a:solidFill>
-            <a:ln w="12700">
+              <a:ln>
+                <a:noFill/>
+              </a:ln>
+            </p:spPr>
+            <p:style>
+              <a:lnRef idx="2">
+                <a:schemeClr val="accent1">
+                  <a:shade val="50000"/>
+                </a:schemeClr>
+              </a:lnRef>
+              <a:fillRef idx="1">
+                <a:schemeClr val="accent1"/>
+              </a:fillRef>
+              <a:effectRef idx="0">
+                <a:schemeClr val="accent1"/>
+              </a:effectRef>
+              <a:fontRef idx="minor">
+                <a:schemeClr val="lt1"/>
+              </a:fontRef>
+            </p:style>
+            <p:txBody>
+              <a:bodyPr rtlCol="0" anchor="ctr"/>
+              <a:lstStyle/>
+              <a:p>
+                <a:pPr algn="ctr"/>
+                <a:r>
+                  <a:rPr lang="en-US" sz="1200" dirty="0"/>
+                  <a:t>Command Box</a:t>
+                </a:r>
+                <a:endParaRPr lang="en-SG" sz="1200" dirty="0"/>
+              </a:p>
+            </p:txBody>
+          </p:sp>
+          <p:sp>
+            <p:nvSpPr>
+              <p:cNvPr id="10" name="Frame 9">
+                <a:extLst>
+                  <a:ext uri="{FF2B5EF4-FFF2-40B4-BE49-F238E27FC236}">
+                    <a16:creationId xmlns:a16="http://schemas.microsoft.com/office/drawing/2014/main" id="{5318FAC7-CBDD-486A-8D8E-BFC9A3AA4AB7}"/>
+                  </a:ext>
+                </a:extLst>
+              </p:cNvPr>
+              <p:cNvSpPr/>
+              <p:nvPr/>
+            </p:nvSpPr>
+            <p:spPr>
+              <a:xfrm>
+                <a:off x="1904330" y="1034424"/>
+                <a:ext cx="8383337" cy="775323"/>
+              </a:xfrm>
+              <a:prstGeom prst="frame">
+                <a:avLst>
+                  <a:gd name="adj1" fmla="val 2883"/>
+                </a:avLst>
+              </a:prstGeom>
               <a:solidFill>
-                <a:srgbClr val="FF0000"/>
+                <a:srgbClr val="FC3737"/>
               </a:solidFill>
-            </a:ln>
-          </p:spPr>
-          <p:style>
-            <a:lnRef idx="2">
-              <a:schemeClr val="accent1">
-                <a:shade val="50000"/>
-              </a:schemeClr>
-            </a:lnRef>
-            <a:fillRef idx="1">
-              <a:schemeClr val="accent1"/>
-            </a:fillRef>
-            <a:effectRef idx="0">
-              <a:schemeClr val="accent1"/>
-            </a:effectRef>
-            <a:fontRef idx="minor">
-              <a:schemeClr val="lt1"/>
-            </a:fontRef>
-          </p:style>
-          <p:txBody>
-            <a:bodyPr rtlCol="0" anchor="ctr"/>
-            <a:lstStyle/>
-            <a:p>
-              <a:pPr algn="ctr"/>
-              <a:endParaRPr lang="en-SG">
+              <a:ln w="12700">
                 <a:solidFill>
-                  <a:schemeClr val="tx1"/>
+                  <a:srgbClr val="FF0000"/>
                 </a:solidFill>
-              </a:endParaRPr>
-            </a:p>
-          </p:txBody>
-        </p:sp>
-        <p:sp>
-          <p:nvSpPr>
-            <p:cNvPr id="11" name="Frame 10">
-              <a:extLst>
-                <a:ext uri="{FF2B5EF4-FFF2-40B4-BE49-F238E27FC236}">
-                  <a16:creationId xmlns:a16="http://schemas.microsoft.com/office/drawing/2014/main" id="{7F34F040-8AE3-4116-8F58-EC7D53DEC90A}"/>
-                </a:ext>
-              </a:extLst>
-            </p:cNvPr>
-            <p:cNvSpPr/>
-            <p:nvPr/>
-          </p:nvSpPr>
-          <p:spPr>
-            <a:xfrm>
-              <a:off x="1912769" y="576597"/>
-              <a:ext cx="8374897" cy="342897"/>
-            </a:xfrm>
-            <a:prstGeom prst="frame">
-              <a:avLst>
-                <a:gd name="adj1" fmla="val 3930"/>
-              </a:avLst>
-            </a:prstGeom>
-            <a:solidFill>
-              <a:srgbClr val="FC3737"/>
-            </a:solidFill>
-            <a:ln>
+              </a:ln>
+            </p:spPr>
+            <p:style>
+              <a:lnRef idx="2">
+                <a:schemeClr val="accent1">
+                  <a:shade val="50000"/>
+                </a:schemeClr>
+              </a:lnRef>
+              <a:fillRef idx="1">
+                <a:schemeClr val="accent1"/>
+              </a:fillRef>
+              <a:effectRef idx="0">
+                <a:schemeClr val="accent1"/>
+              </a:effectRef>
+              <a:fontRef idx="minor">
+                <a:schemeClr val="lt1"/>
+              </a:fontRef>
+            </p:style>
+            <p:txBody>
+              <a:bodyPr rtlCol="0" anchor="ctr"/>
+              <a:lstStyle/>
+              <a:p>
+                <a:pPr algn="ctr"/>
+                <a:endParaRPr lang="en-SG">
+                  <a:solidFill>
+                    <a:schemeClr val="tx1"/>
+                  </a:solidFill>
+                </a:endParaRPr>
+              </a:p>
+            </p:txBody>
+          </p:sp>
+          <p:sp>
+            <p:nvSpPr>
+              <p:cNvPr id="11" name="Frame 10">
+                <a:extLst>
+                  <a:ext uri="{FF2B5EF4-FFF2-40B4-BE49-F238E27FC236}">
+                    <a16:creationId xmlns:a16="http://schemas.microsoft.com/office/drawing/2014/main" id="{7F34F040-8AE3-4116-8F58-EC7D53DEC90A}"/>
+                  </a:ext>
+                </a:extLst>
+              </p:cNvPr>
+              <p:cNvSpPr/>
+              <p:nvPr/>
+            </p:nvSpPr>
+            <p:spPr>
+              <a:xfrm>
+                <a:off x="1912769" y="576597"/>
+                <a:ext cx="8374897" cy="342897"/>
+              </a:xfrm>
+              <a:prstGeom prst="frame">
+                <a:avLst>
+                  <a:gd name="adj1" fmla="val 3930"/>
+                </a:avLst>
+              </a:prstGeom>
               <a:solidFill>
-                <a:srgbClr val="FF0000"/>
+                <a:srgbClr val="FC3737"/>
               </a:solidFill>
-            </a:ln>
-          </p:spPr>
-          <p:style>
-            <a:lnRef idx="2">
-              <a:schemeClr val="accent1">
-                <a:shade val="50000"/>
-              </a:schemeClr>
-            </a:lnRef>
-            <a:fillRef idx="1">
-              <a:schemeClr val="accent1"/>
-            </a:fillRef>
-            <a:effectRef idx="0">
-              <a:schemeClr val="accent1"/>
-            </a:effectRef>
-            <a:fontRef idx="minor">
-              <a:schemeClr val="lt1"/>
-            </a:fontRef>
-          </p:style>
-          <p:txBody>
-            <a:bodyPr rtlCol="0" anchor="ctr"/>
-            <a:lstStyle/>
-            <a:p>
-              <a:pPr algn="ctr"/>
-              <a:endParaRPr lang="en-SG">
+              <a:ln>
                 <a:solidFill>
-                  <a:schemeClr val="tx1"/>
+                  <a:srgbClr val="FF0000"/>
                 </a:solidFill>
-              </a:endParaRPr>
-            </a:p>
-          </p:txBody>
-        </p:sp>
-        <p:cxnSp>
-          <p:nvCxnSpPr>
-            <p:cNvPr id="12" name="Straight Arrow Connector 11">
-              <a:extLst>
-                <a:ext uri="{FF2B5EF4-FFF2-40B4-BE49-F238E27FC236}">
-                  <a16:creationId xmlns:a16="http://schemas.microsoft.com/office/drawing/2014/main" id="{BB8A6726-E0D2-4419-904A-0B43B5C83E55}"/>
-                </a:ext>
-              </a:extLst>
-            </p:cNvPr>
-            <p:cNvCxnSpPr>
-              <a:cxnSpLocks/>
-            </p:cNvCxnSpPr>
-            <p:nvPr/>
-          </p:nvCxnSpPr>
-          <p:spPr>
-            <a:xfrm flipH="1">
-              <a:off x="10287666" y="1445634"/>
-              <a:ext cx="286822" cy="0"/>
-            </a:xfrm>
-            <a:prstGeom prst="straightConnector1">
-              <a:avLst/>
-            </a:prstGeom>
-            <a:ln>
+              </a:ln>
+            </p:spPr>
+            <p:style>
+              <a:lnRef idx="2">
+                <a:schemeClr val="accent1">
+                  <a:shade val="50000"/>
+                </a:schemeClr>
+              </a:lnRef>
+              <a:fillRef idx="1">
+                <a:schemeClr val="accent1"/>
+              </a:fillRef>
+              <a:effectRef idx="0">
+                <a:schemeClr val="accent1"/>
+              </a:effectRef>
+              <a:fontRef idx="minor">
+                <a:schemeClr val="lt1"/>
+              </a:fontRef>
+            </p:style>
+            <p:txBody>
+              <a:bodyPr rtlCol="0" anchor="ctr"/>
+              <a:lstStyle/>
+              <a:p>
+                <a:pPr algn="ctr"/>
+                <a:endParaRPr lang="en-SG">
+                  <a:solidFill>
+                    <a:schemeClr val="tx1"/>
+                  </a:solidFill>
+                </a:endParaRPr>
+              </a:p>
+            </p:txBody>
+          </p:sp>
+          <p:cxnSp>
+            <p:nvCxnSpPr>
+              <p:cNvPr id="12" name="Straight Arrow Connector 11">
+                <a:extLst>
+                  <a:ext uri="{FF2B5EF4-FFF2-40B4-BE49-F238E27FC236}">
+                    <a16:creationId xmlns:a16="http://schemas.microsoft.com/office/drawing/2014/main" id="{BB8A6726-E0D2-4419-904A-0B43B5C83E55}"/>
+                  </a:ext>
+                </a:extLst>
+              </p:cNvPr>
+              <p:cNvCxnSpPr>
+                <a:cxnSpLocks/>
+              </p:cNvCxnSpPr>
+              <p:nvPr/>
+            </p:nvCxnSpPr>
+            <p:spPr>
+              <a:xfrm flipH="1">
+                <a:off x="10287666" y="1445634"/>
+                <a:ext cx="286822" cy="0"/>
+              </a:xfrm>
+              <a:prstGeom prst="straightConnector1">
+                <a:avLst/>
+              </a:prstGeom>
+              <a:ln>
+                <a:solidFill>
+                  <a:schemeClr val="tx2"/>
+                </a:solidFill>
+                <a:tailEnd type="triangle"/>
+              </a:ln>
+            </p:spPr>
+            <p:style>
+              <a:lnRef idx="3">
+                <a:schemeClr val="dk1"/>
+              </a:lnRef>
+              <a:fillRef idx="0">
+                <a:schemeClr val="dk1"/>
+              </a:fillRef>
+              <a:effectRef idx="2">
+                <a:schemeClr val="dk1"/>
+              </a:effectRef>
+              <a:fontRef idx="minor">
+                <a:schemeClr val="tx1"/>
+              </a:fontRef>
+            </p:style>
+          </p:cxnSp>
+          <p:sp>
+            <p:nvSpPr>
+              <p:cNvPr id="13" name="Rectangle 12">
+                <a:extLst>
+                  <a:ext uri="{FF2B5EF4-FFF2-40B4-BE49-F238E27FC236}">
+                    <a16:creationId xmlns:a16="http://schemas.microsoft.com/office/drawing/2014/main" id="{22E41409-D9C4-4EFF-BB69-027340A492B8}"/>
+                  </a:ext>
+                </a:extLst>
+              </p:cNvPr>
+              <p:cNvSpPr/>
+              <p:nvPr/>
+            </p:nvSpPr>
+            <p:spPr>
+              <a:xfrm>
+                <a:off x="10574488" y="1274185"/>
+                <a:ext cx="1312712" cy="342897"/>
+              </a:xfrm>
+              <a:prstGeom prst="rect">
+                <a:avLst/>
+              </a:prstGeom>
               <a:solidFill>
                 <a:schemeClr val="tx2"/>
               </a:solidFill>
-              <a:tailEnd type="triangle"/>
-            </a:ln>
-          </p:spPr>
-          <p:style>
-            <a:lnRef idx="3">
-              <a:schemeClr val="dk1"/>
-            </a:lnRef>
-            <a:fillRef idx="0">
-              <a:schemeClr val="dk1"/>
-            </a:fillRef>
-            <a:effectRef idx="2">
-              <a:schemeClr val="dk1"/>
-            </a:effectRef>
-            <a:fontRef idx="minor">
-              <a:schemeClr val="tx1"/>
-            </a:fontRef>
-          </p:style>
-        </p:cxnSp>
-        <p:sp>
-          <p:nvSpPr>
-            <p:cNvPr id="13" name="Rectangle 12">
-              <a:extLst>
-                <a:ext uri="{FF2B5EF4-FFF2-40B4-BE49-F238E27FC236}">
-                  <a16:creationId xmlns:a16="http://schemas.microsoft.com/office/drawing/2014/main" id="{22E41409-D9C4-4EFF-BB69-027340A492B8}"/>
-                </a:ext>
-              </a:extLst>
-            </p:cNvPr>
-            <p:cNvSpPr/>
-            <p:nvPr/>
-          </p:nvSpPr>
-          <p:spPr>
-            <a:xfrm>
-              <a:off x="10574488" y="1274185"/>
-              <a:ext cx="1312712" cy="342897"/>
-            </a:xfrm>
-            <a:prstGeom prst="rect">
-              <a:avLst/>
-            </a:prstGeom>
-            <a:solidFill>
-              <a:schemeClr val="tx2"/>
-            </a:solidFill>
-            <a:ln>
-              <a:noFill/>
-            </a:ln>
-          </p:spPr>
-          <p:style>
-            <a:lnRef idx="2">
-              <a:schemeClr val="accent1">
-                <a:shade val="50000"/>
-              </a:schemeClr>
-            </a:lnRef>
-            <a:fillRef idx="1">
-              <a:schemeClr val="accent1"/>
-            </a:fillRef>
-            <a:effectRef idx="0">
-              <a:schemeClr val="accent1"/>
-            </a:effectRef>
-            <a:fontRef idx="minor">
-              <a:schemeClr val="lt1"/>
-            </a:fontRef>
-          </p:style>
-          <p:txBody>
-            <a:bodyPr rtlCol="0" anchor="ctr"/>
-            <a:lstStyle/>
-            <a:p>
-              <a:pPr algn="ctr"/>
-              <a:r>
-                <a:rPr lang="en-US" sz="1200" dirty="0"/>
-                <a:t>Result Box</a:t>
-              </a:r>
-              <a:endParaRPr lang="en-SG" sz="1200" dirty="0"/>
-            </a:p>
-          </p:txBody>
-        </p:sp>
-        <p:sp>
-          <p:nvSpPr>
-            <p:cNvPr id="15" name="Frame 14">
-              <a:extLst>
-                <a:ext uri="{FF2B5EF4-FFF2-40B4-BE49-F238E27FC236}">
-                  <a16:creationId xmlns:a16="http://schemas.microsoft.com/office/drawing/2014/main" id="{49011731-F177-4333-B131-7FD76A8DDAB0}"/>
-                </a:ext>
-              </a:extLst>
-            </p:cNvPr>
-            <p:cNvSpPr/>
-            <p:nvPr/>
-          </p:nvSpPr>
-          <p:spPr>
-            <a:xfrm>
-              <a:off x="1904329" y="3578488"/>
-              <a:ext cx="8383337" cy="2965184"/>
-            </a:xfrm>
-            <a:prstGeom prst="frame">
-              <a:avLst>
-                <a:gd name="adj1" fmla="val 996"/>
-              </a:avLst>
-            </a:prstGeom>
-            <a:solidFill>
-              <a:srgbClr val="FC3737"/>
-            </a:solidFill>
-            <a:ln w="12700">
+              <a:ln>
+                <a:noFill/>
+              </a:ln>
+            </p:spPr>
+            <p:style>
+              <a:lnRef idx="2">
+                <a:schemeClr val="accent1">
+                  <a:shade val="50000"/>
+                </a:schemeClr>
+              </a:lnRef>
+              <a:fillRef idx="1">
+                <a:schemeClr val="accent1"/>
+              </a:fillRef>
+              <a:effectRef idx="0">
+                <a:schemeClr val="accent1"/>
+              </a:effectRef>
+              <a:fontRef idx="minor">
+                <a:schemeClr val="lt1"/>
+              </a:fontRef>
+            </p:style>
+            <p:txBody>
+              <a:bodyPr rtlCol="0" anchor="ctr"/>
+              <a:lstStyle/>
+              <a:p>
+                <a:pPr algn="ctr"/>
+                <a:r>
+                  <a:rPr lang="en-US" sz="1200" dirty="0"/>
+                  <a:t>Result Box</a:t>
+                </a:r>
+                <a:endParaRPr lang="en-SG" sz="1200" dirty="0"/>
+              </a:p>
+            </p:txBody>
+          </p:sp>
+          <p:sp>
+            <p:nvSpPr>
+              <p:cNvPr id="15" name="Frame 14">
+                <a:extLst>
+                  <a:ext uri="{FF2B5EF4-FFF2-40B4-BE49-F238E27FC236}">
+                    <a16:creationId xmlns:a16="http://schemas.microsoft.com/office/drawing/2014/main" id="{49011731-F177-4333-B131-7FD76A8DDAB0}"/>
+                  </a:ext>
+                </a:extLst>
+              </p:cNvPr>
+              <p:cNvSpPr/>
+              <p:nvPr/>
+            </p:nvSpPr>
+            <p:spPr>
+              <a:xfrm>
+                <a:off x="1904329" y="3578488"/>
+                <a:ext cx="8383337" cy="2965184"/>
+              </a:xfrm>
+              <a:prstGeom prst="frame">
+                <a:avLst>
+                  <a:gd name="adj1" fmla="val 996"/>
+                </a:avLst>
+              </a:prstGeom>
               <a:solidFill>
-                <a:srgbClr val="FF0000"/>
+                <a:srgbClr val="FC3737"/>
               </a:solidFill>
-            </a:ln>
-          </p:spPr>
-          <p:style>
-            <a:lnRef idx="2">
-              <a:schemeClr val="accent1">
-                <a:shade val="50000"/>
-              </a:schemeClr>
-            </a:lnRef>
-            <a:fillRef idx="1">
-              <a:schemeClr val="accent1"/>
-            </a:fillRef>
-            <a:effectRef idx="0">
-              <a:schemeClr val="accent1"/>
-            </a:effectRef>
-            <a:fontRef idx="minor">
-              <a:schemeClr val="lt1"/>
-            </a:fontRef>
-          </p:style>
-          <p:txBody>
-            <a:bodyPr rtlCol="0" anchor="ctr"/>
-            <a:lstStyle/>
-            <a:p>
-              <a:pPr algn="ctr"/>
-              <a:endParaRPr lang="en-SG">
+              <a:ln w="12700">
                 <a:solidFill>
-                  <a:schemeClr val="tx1"/>
+                  <a:srgbClr val="FF0000"/>
                 </a:solidFill>
-              </a:endParaRPr>
-            </a:p>
-          </p:txBody>
-        </p:sp>
-        <p:cxnSp>
-          <p:nvCxnSpPr>
-            <p:cNvPr id="16" name="Straight Arrow Connector 15">
-              <a:extLst>
-                <a:ext uri="{FF2B5EF4-FFF2-40B4-BE49-F238E27FC236}">
-                  <a16:creationId xmlns:a16="http://schemas.microsoft.com/office/drawing/2014/main" id="{F211DD80-6CBE-4EC6-8854-962001F12FCE}"/>
-                </a:ext>
-              </a:extLst>
-            </p:cNvPr>
-            <p:cNvCxnSpPr>
-              <a:cxnSpLocks/>
-            </p:cNvCxnSpPr>
-            <p:nvPr/>
-          </p:nvCxnSpPr>
-          <p:spPr>
-            <a:xfrm>
-              <a:off x="1450035" y="4845429"/>
-              <a:ext cx="459698" cy="0"/>
-            </a:xfrm>
-            <a:prstGeom prst="straightConnector1">
-              <a:avLst/>
-            </a:prstGeom>
-            <a:ln>
+              </a:ln>
+            </p:spPr>
+            <p:style>
+              <a:lnRef idx="2">
+                <a:schemeClr val="accent1">
+                  <a:shade val="50000"/>
+                </a:schemeClr>
+              </a:lnRef>
+              <a:fillRef idx="1">
+                <a:schemeClr val="accent1"/>
+              </a:fillRef>
+              <a:effectRef idx="0">
+                <a:schemeClr val="accent1"/>
+              </a:effectRef>
+              <a:fontRef idx="minor">
+                <a:schemeClr val="lt1"/>
+              </a:fontRef>
+            </p:style>
+            <p:txBody>
+              <a:bodyPr rtlCol="0" anchor="ctr"/>
+              <a:lstStyle/>
+              <a:p>
+                <a:pPr algn="ctr"/>
+                <a:endParaRPr lang="en-SG">
+                  <a:solidFill>
+                    <a:schemeClr val="tx1"/>
+                  </a:solidFill>
+                </a:endParaRPr>
+              </a:p>
+            </p:txBody>
+          </p:sp>
+          <p:cxnSp>
+            <p:nvCxnSpPr>
+              <p:cNvPr id="16" name="Straight Arrow Connector 15">
+                <a:extLst>
+                  <a:ext uri="{FF2B5EF4-FFF2-40B4-BE49-F238E27FC236}">
+                    <a16:creationId xmlns:a16="http://schemas.microsoft.com/office/drawing/2014/main" id="{F211DD80-6CBE-4EC6-8854-962001F12FCE}"/>
+                  </a:ext>
+                </a:extLst>
+              </p:cNvPr>
+              <p:cNvCxnSpPr>
+                <a:cxnSpLocks/>
+              </p:cNvCxnSpPr>
+              <p:nvPr/>
+            </p:nvCxnSpPr>
+            <p:spPr>
+              <a:xfrm>
+                <a:off x="1450035" y="4845429"/>
+                <a:ext cx="459698" cy="0"/>
+              </a:xfrm>
+              <a:prstGeom prst="straightConnector1">
+                <a:avLst/>
+              </a:prstGeom>
+              <a:ln>
+                <a:solidFill>
+                  <a:schemeClr val="tx2"/>
+                </a:solidFill>
+                <a:tailEnd type="triangle"/>
+              </a:ln>
+            </p:spPr>
+            <p:style>
+              <a:lnRef idx="3">
+                <a:schemeClr val="dk1"/>
+              </a:lnRef>
+              <a:fillRef idx="0">
+                <a:schemeClr val="dk1"/>
+              </a:fillRef>
+              <a:effectRef idx="2">
+                <a:schemeClr val="dk1"/>
+              </a:effectRef>
+              <a:fontRef idx="minor">
+                <a:schemeClr val="tx1"/>
+              </a:fontRef>
+            </p:style>
+          </p:cxnSp>
+          <p:sp>
+            <p:nvSpPr>
+              <p:cNvPr id="17" name="Rectangle 16">
+                <a:extLst>
+                  <a:ext uri="{FF2B5EF4-FFF2-40B4-BE49-F238E27FC236}">
+                    <a16:creationId xmlns:a16="http://schemas.microsoft.com/office/drawing/2014/main" id="{0C208D57-0268-48E3-9079-A7D30DE6E55D}"/>
+                  </a:ext>
+                </a:extLst>
+              </p:cNvPr>
+              <p:cNvSpPr/>
+              <p:nvPr/>
+            </p:nvSpPr>
+            <p:spPr>
+              <a:xfrm>
+                <a:off x="129429" y="4653297"/>
+                <a:ext cx="1404095" cy="342897"/>
+              </a:xfrm>
+              <a:prstGeom prst="rect">
+                <a:avLst/>
+              </a:prstGeom>
               <a:solidFill>
                 <a:schemeClr val="tx2"/>
               </a:solidFill>
-              <a:tailEnd type="triangle"/>
-            </a:ln>
-          </p:spPr>
-          <p:style>
-            <a:lnRef idx="3">
-              <a:schemeClr val="dk1"/>
-            </a:lnRef>
-            <a:fillRef idx="0">
-              <a:schemeClr val="dk1"/>
-            </a:fillRef>
-            <a:effectRef idx="2">
-              <a:schemeClr val="dk1"/>
-            </a:effectRef>
-            <a:fontRef idx="minor">
-              <a:schemeClr val="tx1"/>
-            </a:fontRef>
-          </p:style>
-        </p:cxnSp>
-        <p:sp>
-          <p:nvSpPr>
-            <p:cNvPr id="17" name="Rectangle 16">
-              <a:extLst>
-                <a:ext uri="{FF2B5EF4-FFF2-40B4-BE49-F238E27FC236}">
-                  <a16:creationId xmlns:a16="http://schemas.microsoft.com/office/drawing/2014/main" id="{0C208D57-0268-48E3-9079-A7D30DE6E55D}"/>
-                </a:ext>
-              </a:extLst>
-            </p:cNvPr>
-            <p:cNvSpPr/>
-            <p:nvPr/>
-          </p:nvSpPr>
-          <p:spPr>
-            <a:xfrm>
-              <a:off x="129429" y="4653297"/>
-              <a:ext cx="1404095" cy="342897"/>
-            </a:xfrm>
-            <a:prstGeom prst="rect">
-              <a:avLst/>
-            </a:prstGeom>
-            <a:solidFill>
-              <a:schemeClr val="tx2"/>
-            </a:solidFill>
-            <a:ln>
-              <a:noFill/>
-            </a:ln>
-          </p:spPr>
-          <p:style>
-            <a:lnRef idx="2">
-              <a:schemeClr val="accent1">
-                <a:shade val="50000"/>
-              </a:schemeClr>
-            </a:lnRef>
-            <a:fillRef idx="1">
-              <a:schemeClr val="accent1"/>
-            </a:fillRef>
-            <a:effectRef idx="0">
-              <a:schemeClr val="accent1"/>
-            </a:effectRef>
-            <a:fontRef idx="minor">
-              <a:schemeClr val="lt1"/>
-            </a:fontRef>
-          </p:style>
-          <p:txBody>
-            <a:bodyPr rtlCol="0" anchor="ctr"/>
-            <a:lstStyle/>
-            <a:p>
-              <a:pPr algn="ctr"/>
-              <a:r>
-                <a:rPr lang="en-US" sz="1200" dirty="0"/>
-                <a:t>List of transactions </a:t>
-              </a:r>
-              <a:endParaRPr lang="en-SG" sz="1200" dirty="0"/>
-            </a:p>
-          </p:txBody>
-        </p:sp>
-        <p:sp>
-          <p:nvSpPr>
-            <p:cNvPr id="18" name="Frame 17">
-              <a:extLst>
-                <a:ext uri="{FF2B5EF4-FFF2-40B4-BE49-F238E27FC236}">
-                  <a16:creationId xmlns:a16="http://schemas.microsoft.com/office/drawing/2014/main" id="{ADF7DA7B-0630-4CFA-B4FF-CB6C31FC655F}"/>
-                </a:ext>
-              </a:extLst>
-            </p:cNvPr>
-            <p:cNvSpPr/>
-            <p:nvPr/>
-          </p:nvSpPr>
-          <p:spPr>
-            <a:xfrm>
-              <a:off x="1904328" y="1924676"/>
-              <a:ext cx="8383337" cy="841383"/>
-            </a:xfrm>
-            <a:prstGeom prst="frame">
-              <a:avLst>
-                <a:gd name="adj1" fmla="val 1960"/>
-              </a:avLst>
-            </a:prstGeom>
-            <a:solidFill>
-              <a:srgbClr val="FC3737"/>
-            </a:solidFill>
-            <a:ln w="12700">
+              <a:ln>
+                <a:noFill/>
+              </a:ln>
+            </p:spPr>
+            <p:style>
+              <a:lnRef idx="2">
+                <a:schemeClr val="accent1">
+                  <a:shade val="50000"/>
+                </a:schemeClr>
+              </a:lnRef>
+              <a:fillRef idx="1">
+                <a:schemeClr val="accent1"/>
+              </a:fillRef>
+              <a:effectRef idx="0">
+                <a:schemeClr val="accent1"/>
+              </a:effectRef>
+              <a:fontRef idx="minor">
+                <a:schemeClr val="lt1"/>
+              </a:fontRef>
+            </p:style>
+            <p:txBody>
+              <a:bodyPr rtlCol="0" anchor="ctr"/>
+              <a:lstStyle/>
+              <a:p>
+                <a:pPr algn="ctr"/>
+                <a:r>
+                  <a:rPr lang="en-US" sz="1200" dirty="0"/>
+                  <a:t>List of transactions </a:t>
+                </a:r>
+                <a:endParaRPr lang="en-SG" sz="1200" dirty="0"/>
+              </a:p>
+            </p:txBody>
+          </p:sp>
+          <p:sp>
+            <p:nvSpPr>
+              <p:cNvPr id="18" name="Frame 17">
+                <a:extLst>
+                  <a:ext uri="{FF2B5EF4-FFF2-40B4-BE49-F238E27FC236}">
+                    <a16:creationId xmlns:a16="http://schemas.microsoft.com/office/drawing/2014/main" id="{ADF7DA7B-0630-4CFA-B4FF-CB6C31FC655F}"/>
+                  </a:ext>
+                </a:extLst>
+              </p:cNvPr>
+              <p:cNvSpPr/>
+              <p:nvPr/>
+            </p:nvSpPr>
+            <p:spPr>
+              <a:xfrm>
+                <a:off x="1904328" y="1924676"/>
+                <a:ext cx="8383337" cy="841383"/>
+              </a:xfrm>
+              <a:prstGeom prst="frame">
+                <a:avLst>
+                  <a:gd name="adj1" fmla="val 1960"/>
+                </a:avLst>
+              </a:prstGeom>
               <a:solidFill>
-                <a:srgbClr val="FF0000"/>
+                <a:srgbClr val="FC3737"/>
               </a:solidFill>
-            </a:ln>
-          </p:spPr>
-          <p:style>
-            <a:lnRef idx="2">
-              <a:schemeClr val="accent1">
-                <a:shade val="50000"/>
-              </a:schemeClr>
-            </a:lnRef>
-            <a:fillRef idx="1">
-              <a:schemeClr val="accent1"/>
-            </a:fillRef>
-            <a:effectRef idx="0">
-              <a:schemeClr val="accent1"/>
-            </a:effectRef>
-            <a:fontRef idx="minor">
-              <a:schemeClr val="lt1"/>
-            </a:fontRef>
-          </p:style>
-          <p:txBody>
-            <a:bodyPr rtlCol="0" anchor="ctr"/>
-            <a:lstStyle/>
-            <a:p>
-              <a:pPr algn="ctr"/>
-              <a:endParaRPr lang="en-SG">
+              <a:ln w="12700">
                 <a:solidFill>
-                  <a:schemeClr val="tx1"/>
+                  <a:srgbClr val="FF0000"/>
                 </a:solidFill>
-              </a:endParaRPr>
-            </a:p>
-          </p:txBody>
-        </p:sp>
-        <p:cxnSp>
-          <p:nvCxnSpPr>
-            <p:cNvPr id="19" name="Straight Arrow Connector 18">
-              <a:extLst>
-                <a:ext uri="{FF2B5EF4-FFF2-40B4-BE49-F238E27FC236}">
-                  <a16:creationId xmlns:a16="http://schemas.microsoft.com/office/drawing/2014/main" id="{1CE87B34-E52E-4705-AD30-87A44198B1E7}"/>
-                </a:ext>
-              </a:extLst>
-            </p:cNvPr>
-            <p:cNvCxnSpPr>
-              <a:cxnSpLocks/>
-            </p:cNvCxnSpPr>
-            <p:nvPr/>
-          </p:nvCxnSpPr>
-          <p:spPr>
-            <a:xfrm>
-              <a:off x="1442745" y="2359674"/>
-              <a:ext cx="459698" cy="0"/>
-            </a:xfrm>
-            <a:prstGeom prst="straightConnector1">
-              <a:avLst/>
-            </a:prstGeom>
-            <a:ln>
+              </a:ln>
+            </p:spPr>
+            <p:style>
+              <a:lnRef idx="2">
+                <a:schemeClr val="accent1">
+                  <a:shade val="50000"/>
+                </a:schemeClr>
+              </a:lnRef>
+              <a:fillRef idx="1">
+                <a:schemeClr val="accent1"/>
+              </a:fillRef>
+              <a:effectRef idx="0">
+                <a:schemeClr val="accent1"/>
+              </a:effectRef>
+              <a:fontRef idx="minor">
+                <a:schemeClr val="lt1"/>
+              </a:fontRef>
+            </p:style>
+            <p:txBody>
+              <a:bodyPr rtlCol="0" anchor="ctr"/>
+              <a:lstStyle/>
+              <a:p>
+                <a:pPr algn="ctr"/>
+                <a:endParaRPr lang="en-SG">
+                  <a:solidFill>
+                    <a:schemeClr val="tx1"/>
+                  </a:solidFill>
+                </a:endParaRPr>
+              </a:p>
+            </p:txBody>
+          </p:sp>
+          <p:cxnSp>
+            <p:nvCxnSpPr>
+              <p:cNvPr id="19" name="Straight Arrow Connector 18">
+                <a:extLst>
+                  <a:ext uri="{FF2B5EF4-FFF2-40B4-BE49-F238E27FC236}">
+                    <a16:creationId xmlns:a16="http://schemas.microsoft.com/office/drawing/2014/main" id="{1CE87B34-E52E-4705-AD30-87A44198B1E7}"/>
+                  </a:ext>
+                </a:extLst>
+              </p:cNvPr>
+              <p:cNvCxnSpPr>
+                <a:cxnSpLocks/>
+              </p:cNvCxnSpPr>
+              <p:nvPr/>
+            </p:nvCxnSpPr>
+            <p:spPr>
+              <a:xfrm>
+                <a:off x="1442745" y="2359674"/>
+                <a:ext cx="459698" cy="0"/>
+              </a:xfrm>
+              <a:prstGeom prst="straightConnector1">
+                <a:avLst/>
+              </a:prstGeom>
+              <a:ln>
+                <a:solidFill>
+                  <a:schemeClr val="tx2"/>
+                </a:solidFill>
+                <a:tailEnd type="triangle"/>
+              </a:ln>
+            </p:spPr>
+            <p:style>
+              <a:lnRef idx="3">
+                <a:schemeClr val="dk1"/>
+              </a:lnRef>
+              <a:fillRef idx="0">
+                <a:schemeClr val="dk1"/>
+              </a:fillRef>
+              <a:effectRef idx="2">
+                <a:schemeClr val="dk1"/>
+              </a:effectRef>
+              <a:fontRef idx="minor">
+                <a:schemeClr val="tx1"/>
+              </a:fontRef>
+            </p:style>
+          </p:cxnSp>
+          <p:sp>
+            <p:nvSpPr>
+              <p:cNvPr id="20" name="Rectangle 19">
+                <a:extLst>
+                  <a:ext uri="{FF2B5EF4-FFF2-40B4-BE49-F238E27FC236}">
+                    <a16:creationId xmlns:a16="http://schemas.microsoft.com/office/drawing/2014/main" id="{C82D5E5B-7CFC-4CD8-9367-E49E5BDE4970}"/>
+                  </a:ext>
+                </a:extLst>
+              </p:cNvPr>
+              <p:cNvSpPr/>
+              <p:nvPr/>
+            </p:nvSpPr>
+            <p:spPr>
+              <a:xfrm>
+                <a:off x="129428" y="2122290"/>
+                <a:ext cx="1404095" cy="474768"/>
+              </a:xfrm>
+              <a:prstGeom prst="rect">
+                <a:avLst/>
+              </a:prstGeom>
               <a:solidFill>
                 <a:schemeClr val="tx2"/>
               </a:solidFill>
-              <a:tailEnd type="triangle"/>
-            </a:ln>
-          </p:spPr>
-          <p:style>
-            <a:lnRef idx="3">
-              <a:schemeClr val="dk1"/>
-            </a:lnRef>
-            <a:fillRef idx="0">
-              <a:schemeClr val="dk1"/>
-            </a:fillRef>
-            <a:effectRef idx="2">
-              <a:schemeClr val="dk1"/>
-            </a:effectRef>
-            <a:fontRef idx="minor">
-              <a:schemeClr val="tx1"/>
-            </a:fontRef>
-          </p:style>
-        </p:cxnSp>
-        <p:sp>
-          <p:nvSpPr>
-            <p:cNvPr id="20" name="Rectangle 19">
-              <a:extLst>
-                <a:ext uri="{FF2B5EF4-FFF2-40B4-BE49-F238E27FC236}">
-                  <a16:creationId xmlns:a16="http://schemas.microsoft.com/office/drawing/2014/main" id="{C82D5E5B-7CFC-4CD8-9367-E49E5BDE4970}"/>
-                </a:ext>
-              </a:extLst>
-            </p:cNvPr>
-            <p:cNvSpPr/>
-            <p:nvPr/>
-          </p:nvSpPr>
-          <p:spPr>
-            <a:xfrm>
-              <a:off x="129428" y="2122290"/>
-              <a:ext cx="1404095" cy="474768"/>
-            </a:xfrm>
-            <a:prstGeom prst="rect">
-              <a:avLst/>
-            </a:prstGeom>
-            <a:solidFill>
-              <a:schemeClr val="tx2"/>
-            </a:solidFill>
-            <a:ln>
-              <a:noFill/>
-            </a:ln>
-          </p:spPr>
-          <p:style>
-            <a:lnRef idx="2">
-              <a:schemeClr val="accent1">
-                <a:shade val="50000"/>
-              </a:schemeClr>
-            </a:lnRef>
-            <a:fillRef idx="1">
-              <a:schemeClr val="accent1"/>
-            </a:fillRef>
-            <a:effectRef idx="0">
-              <a:schemeClr val="accent1"/>
-            </a:effectRef>
-            <a:fontRef idx="minor">
-              <a:schemeClr val="lt1"/>
-            </a:fontRef>
-          </p:style>
-          <p:txBody>
-            <a:bodyPr rtlCol="0" anchor="ctr"/>
-            <a:lstStyle/>
-            <a:p>
-              <a:pPr algn="ctr"/>
-              <a:r>
-                <a:rPr lang="en-US" sz="1200" dirty="0"/>
-                <a:t>Overview of the filtered month</a:t>
-              </a:r>
-              <a:endParaRPr lang="en-SG" sz="1200" dirty="0"/>
-            </a:p>
-          </p:txBody>
-        </p:sp>
-        <p:cxnSp>
-          <p:nvCxnSpPr>
-            <p:cNvPr id="21" name="Straight Arrow Connector 20">
-              <a:extLst>
-                <a:ext uri="{FF2B5EF4-FFF2-40B4-BE49-F238E27FC236}">
-                  <a16:creationId xmlns:a16="http://schemas.microsoft.com/office/drawing/2014/main" id="{23FA0B9E-0504-4B5C-A391-61AFC43953A7}"/>
-                </a:ext>
-              </a:extLst>
-            </p:cNvPr>
-            <p:cNvCxnSpPr>
-              <a:cxnSpLocks/>
-            </p:cNvCxnSpPr>
-            <p:nvPr/>
-          </p:nvCxnSpPr>
-          <p:spPr>
-            <a:xfrm>
-              <a:off x="1450034" y="2958191"/>
-              <a:ext cx="459698" cy="0"/>
-            </a:xfrm>
-            <a:prstGeom prst="straightConnector1">
-              <a:avLst/>
-            </a:prstGeom>
-            <a:ln>
+              <a:ln>
+                <a:noFill/>
+              </a:ln>
+            </p:spPr>
+            <p:style>
+              <a:lnRef idx="2">
+                <a:schemeClr val="accent1">
+                  <a:shade val="50000"/>
+                </a:schemeClr>
+              </a:lnRef>
+              <a:fillRef idx="1">
+                <a:schemeClr val="accent1"/>
+              </a:fillRef>
+              <a:effectRef idx="0">
+                <a:schemeClr val="accent1"/>
+              </a:effectRef>
+              <a:fontRef idx="minor">
+                <a:schemeClr val="lt1"/>
+              </a:fontRef>
+            </p:style>
+            <p:txBody>
+              <a:bodyPr rtlCol="0" anchor="ctr"/>
+              <a:lstStyle/>
+              <a:p>
+                <a:pPr algn="ctr"/>
+                <a:r>
+                  <a:rPr lang="en-US" sz="1200" dirty="0"/>
+                  <a:t>Overview of the filtered month</a:t>
+                </a:r>
+                <a:endParaRPr lang="en-SG" sz="1200" dirty="0"/>
+              </a:p>
+            </p:txBody>
+          </p:sp>
+          <p:cxnSp>
+            <p:nvCxnSpPr>
+              <p:cNvPr id="21" name="Straight Arrow Connector 20">
+                <a:extLst>
+                  <a:ext uri="{FF2B5EF4-FFF2-40B4-BE49-F238E27FC236}">
+                    <a16:creationId xmlns:a16="http://schemas.microsoft.com/office/drawing/2014/main" id="{23FA0B9E-0504-4B5C-A391-61AFC43953A7}"/>
+                  </a:ext>
+                </a:extLst>
+              </p:cNvPr>
+              <p:cNvCxnSpPr>
+                <a:cxnSpLocks/>
+              </p:cNvCxnSpPr>
+              <p:nvPr/>
+            </p:nvCxnSpPr>
+            <p:spPr>
+              <a:xfrm>
+                <a:off x="1450034" y="2958191"/>
+                <a:ext cx="459698" cy="0"/>
+              </a:xfrm>
+              <a:prstGeom prst="straightConnector1">
+                <a:avLst/>
+              </a:prstGeom>
+              <a:ln>
+                <a:solidFill>
+                  <a:schemeClr val="tx2"/>
+                </a:solidFill>
+                <a:tailEnd type="triangle"/>
+              </a:ln>
+            </p:spPr>
+            <p:style>
+              <a:lnRef idx="3">
+                <a:schemeClr val="dk1"/>
+              </a:lnRef>
+              <a:fillRef idx="0">
+                <a:schemeClr val="dk1"/>
+              </a:fillRef>
+              <a:effectRef idx="2">
+                <a:schemeClr val="dk1"/>
+              </a:effectRef>
+              <a:fontRef idx="minor">
+                <a:schemeClr val="tx1"/>
+              </a:fontRef>
+            </p:style>
+          </p:cxnSp>
+          <p:sp>
+            <p:nvSpPr>
+              <p:cNvPr id="22" name="Rectangle 21">
+                <a:extLst>
+                  <a:ext uri="{FF2B5EF4-FFF2-40B4-BE49-F238E27FC236}">
+                    <a16:creationId xmlns:a16="http://schemas.microsoft.com/office/drawing/2014/main" id="{54A1A0D4-087E-4830-B63D-6145A2FDEEDD}"/>
+                  </a:ext>
+                </a:extLst>
+              </p:cNvPr>
+              <p:cNvSpPr/>
+              <p:nvPr/>
+            </p:nvSpPr>
+            <p:spPr>
+              <a:xfrm>
+                <a:off x="129428" y="2766059"/>
+                <a:ext cx="1404095" cy="342897"/>
+              </a:xfrm>
+              <a:prstGeom prst="rect">
+                <a:avLst/>
+              </a:prstGeom>
               <a:solidFill>
                 <a:schemeClr val="tx2"/>
               </a:solidFill>
-              <a:tailEnd type="triangle"/>
-            </a:ln>
-          </p:spPr>
-          <p:style>
-            <a:lnRef idx="3">
-              <a:schemeClr val="dk1"/>
-            </a:lnRef>
-            <a:fillRef idx="0">
-              <a:schemeClr val="dk1"/>
-            </a:fillRef>
-            <a:effectRef idx="2">
-              <a:schemeClr val="dk1"/>
-            </a:effectRef>
-            <a:fontRef idx="minor">
-              <a:schemeClr val="tx1"/>
-            </a:fontRef>
-          </p:style>
-        </p:cxnSp>
-        <p:sp>
-          <p:nvSpPr>
-            <p:cNvPr id="22" name="Rectangle 21">
-              <a:extLst>
-                <a:ext uri="{FF2B5EF4-FFF2-40B4-BE49-F238E27FC236}">
-                  <a16:creationId xmlns:a16="http://schemas.microsoft.com/office/drawing/2014/main" id="{54A1A0D4-087E-4830-B63D-6145A2FDEEDD}"/>
-                </a:ext>
-              </a:extLst>
-            </p:cNvPr>
-            <p:cNvSpPr/>
-            <p:nvPr/>
-          </p:nvSpPr>
-          <p:spPr>
-            <a:xfrm>
-              <a:off x="129428" y="2766059"/>
-              <a:ext cx="1404095" cy="342897"/>
-            </a:xfrm>
-            <a:prstGeom prst="rect">
-              <a:avLst/>
-            </a:prstGeom>
-            <a:solidFill>
-              <a:schemeClr val="tx2"/>
-            </a:solidFill>
-            <a:ln>
-              <a:noFill/>
-            </a:ln>
-          </p:spPr>
-          <p:style>
-            <a:lnRef idx="2">
-              <a:schemeClr val="accent1">
-                <a:shade val="50000"/>
-              </a:schemeClr>
-            </a:lnRef>
-            <a:fillRef idx="1">
-              <a:schemeClr val="accent1"/>
-            </a:fillRef>
-            <a:effectRef idx="0">
-              <a:schemeClr val="accent1"/>
-            </a:effectRef>
-            <a:fontRef idx="minor">
-              <a:schemeClr val="lt1"/>
-            </a:fontRef>
-          </p:style>
-          <p:txBody>
-            <a:bodyPr rtlCol="0" anchor="ctr"/>
-            <a:lstStyle/>
-            <a:p>
-              <a:pPr algn="ctr"/>
-              <a:r>
-                <a:rPr lang="en-US" sz="1200" dirty="0"/>
-                <a:t>Filtered month</a:t>
-              </a:r>
-              <a:endParaRPr lang="en-SG" sz="1200" dirty="0"/>
-            </a:p>
-          </p:txBody>
-        </p:sp>
-        <p:sp>
-          <p:nvSpPr>
-            <p:cNvPr id="23" name="Frame 22">
-              <a:extLst>
-                <a:ext uri="{FF2B5EF4-FFF2-40B4-BE49-F238E27FC236}">
-                  <a16:creationId xmlns:a16="http://schemas.microsoft.com/office/drawing/2014/main" id="{C7216BAB-3084-4DD0-83F4-E03610D6A102}"/>
-                </a:ext>
-              </a:extLst>
-            </p:cNvPr>
-            <p:cNvSpPr/>
-            <p:nvPr/>
-          </p:nvSpPr>
-          <p:spPr>
-            <a:xfrm>
-              <a:off x="1902444" y="2806732"/>
-              <a:ext cx="1078882" cy="302224"/>
-            </a:xfrm>
-            <a:prstGeom prst="frame">
-              <a:avLst>
-                <a:gd name="adj1" fmla="val 5112"/>
-              </a:avLst>
-            </a:prstGeom>
-            <a:solidFill>
-              <a:srgbClr val="FC3737"/>
-            </a:solidFill>
-            <a:ln w="12700">
+              <a:ln>
+                <a:noFill/>
+              </a:ln>
+            </p:spPr>
+            <p:style>
+              <a:lnRef idx="2">
+                <a:schemeClr val="accent1">
+                  <a:shade val="50000"/>
+                </a:schemeClr>
+              </a:lnRef>
+              <a:fillRef idx="1">
+                <a:schemeClr val="accent1"/>
+              </a:fillRef>
+              <a:effectRef idx="0">
+                <a:schemeClr val="accent1"/>
+              </a:effectRef>
+              <a:fontRef idx="minor">
+                <a:schemeClr val="lt1"/>
+              </a:fontRef>
+            </p:style>
+            <p:txBody>
+              <a:bodyPr rtlCol="0" anchor="ctr"/>
+              <a:lstStyle/>
+              <a:p>
+                <a:pPr algn="ctr"/>
+                <a:r>
+                  <a:rPr lang="en-US" sz="1200" dirty="0"/>
+                  <a:t>Filtered month</a:t>
+                </a:r>
+                <a:endParaRPr lang="en-SG" sz="1200" dirty="0"/>
+              </a:p>
+            </p:txBody>
+          </p:sp>
+          <p:sp>
+            <p:nvSpPr>
+              <p:cNvPr id="23" name="Frame 22">
+                <a:extLst>
+                  <a:ext uri="{FF2B5EF4-FFF2-40B4-BE49-F238E27FC236}">
+                    <a16:creationId xmlns:a16="http://schemas.microsoft.com/office/drawing/2014/main" id="{C7216BAB-3084-4DD0-83F4-E03610D6A102}"/>
+                  </a:ext>
+                </a:extLst>
+              </p:cNvPr>
+              <p:cNvSpPr/>
+              <p:nvPr/>
+            </p:nvSpPr>
+            <p:spPr>
+              <a:xfrm>
+                <a:off x="1902443" y="2806732"/>
+                <a:ext cx="1249129" cy="302224"/>
+              </a:xfrm>
+              <a:prstGeom prst="frame">
+                <a:avLst>
+                  <a:gd name="adj1" fmla="val 5112"/>
+                </a:avLst>
+              </a:prstGeom>
               <a:solidFill>
-                <a:srgbClr val="FF0000"/>
+                <a:srgbClr val="FC3737"/>
               </a:solidFill>
-            </a:ln>
-          </p:spPr>
-          <p:style>
-            <a:lnRef idx="2">
-              <a:schemeClr val="accent1">
-                <a:shade val="50000"/>
-              </a:schemeClr>
-            </a:lnRef>
-            <a:fillRef idx="1">
-              <a:schemeClr val="accent1"/>
-            </a:fillRef>
-            <a:effectRef idx="0">
-              <a:schemeClr val="accent1"/>
-            </a:effectRef>
-            <a:fontRef idx="minor">
-              <a:schemeClr val="lt1"/>
-            </a:fontRef>
-          </p:style>
-          <p:txBody>
-            <a:bodyPr rtlCol="0" anchor="ctr"/>
-            <a:lstStyle/>
-            <a:p>
-              <a:pPr algn="ctr"/>
-              <a:endParaRPr lang="en-SG">
+              <a:ln w="12700">
                 <a:solidFill>
-                  <a:schemeClr val="tx1"/>
+                  <a:srgbClr val="FF0000"/>
                 </a:solidFill>
-              </a:endParaRPr>
-            </a:p>
-          </p:txBody>
-        </p:sp>
-        <p:cxnSp>
-          <p:nvCxnSpPr>
-            <p:cNvPr id="24" name="Straight Arrow Connector 23">
-              <a:extLst>
-                <a:ext uri="{FF2B5EF4-FFF2-40B4-BE49-F238E27FC236}">
-                  <a16:creationId xmlns:a16="http://schemas.microsoft.com/office/drawing/2014/main" id="{A464C352-3D8C-461B-8C67-CAA76E4252FB}"/>
-                </a:ext>
-              </a:extLst>
-            </p:cNvPr>
-            <p:cNvCxnSpPr>
-              <a:cxnSpLocks/>
-            </p:cNvCxnSpPr>
-            <p:nvPr/>
-          </p:nvCxnSpPr>
-          <p:spPr>
-            <a:xfrm flipH="1">
-              <a:off x="10287666" y="2958191"/>
-              <a:ext cx="286822" cy="0"/>
-            </a:xfrm>
-            <a:prstGeom prst="straightConnector1">
-              <a:avLst/>
-            </a:prstGeom>
-            <a:ln>
+              </a:ln>
+            </p:spPr>
+            <p:style>
+              <a:lnRef idx="2">
+                <a:schemeClr val="accent1">
+                  <a:shade val="50000"/>
+                </a:schemeClr>
+              </a:lnRef>
+              <a:fillRef idx="1">
+                <a:schemeClr val="accent1"/>
+              </a:fillRef>
+              <a:effectRef idx="0">
+                <a:schemeClr val="accent1"/>
+              </a:effectRef>
+              <a:fontRef idx="minor">
+                <a:schemeClr val="lt1"/>
+              </a:fontRef>
+            </p:style>
+            <p:txBody>
+              <a:bodyPr rtlCol="0" anchor="ctr"/>
+              <a:lstStyle/>
+              <a:p>
+                <a:pPr algn="ctr"/>
+                <a:endParaRPr lang="en-SG">
+                  <a:solidFill>
+                    <a:schemeClr val="tx1"/>
+                  </a:solidFill>
+                </a:endParaRPr>
+              </a:p>
+            </p:txBody>
+          </p:sp>
+          <p:cxnSp>
+            <p:nvCxnSpPr>
+              <p:cNvPr id="24" name="Straight Arrow Connector 23">
+                <a:extLst>
+                  <a:ext uri="{FF2B5EF4-FFF2-40B4-BE49-F238E27FC236}">
+                    <a16:creationId xmlns:a16="http://schemas.microsoft.com/office/drawing/2014/main" id="{A464C352-3D8C-461B-8C67-CAA76E4252FB}"/>
+                  </a:ext>
+                </a:extLst>
+              </p:cNvPr>
+              <p:cNvCxnSpPr>
+                <a:cxnSpLocks/>
+              </p:cNvCxnSpPr>
+              <p:nvPr/>
+            </p:nvCxnSpPr>
+            <p:spPr>
+              <a:xfrm flipH="1">
+                <a:off x="10287666" y="2958191"/>
+                <a:ext cx="286822" cy="0"/>
+              </a:xfrm>
+              <a:prstGeom prst="straightConnector1">
+                <a:avLst/>
+              </a:prstGeom>
+              <a:ln>
+                <a:solidFill>
+                  <a:schemeClr val="tx2"/>
+                </a:solidFill>
+                <a:tailEnd type="triangle"/>
+              </a:ln>
+            </p:spPr>
+            <p:style>
+              <a:lnRef idx="3">
+                <a:schemeClr val="dk1"/>
+              </a:lnRef>
+              <a:fillRef idx="0">
+                <a:schemeClr val="dk1"/>
+              </a:fillRef>
+              <a:effectRef idx="2">
+                <a:schemeClr val="dk1"/>
+              </a:effectRef>
+              <a:fontRef idx="minor">
+                <a:schemeClr val="tx1"/>
+              </a:fontRef>
+            </p:style>
+          </p:cxnSp>
+          <p:sp>
+            <p:nvSpPr>
+              <p:cNvPr id="25" name="Rectangle 24">
+                <a:extLst>
+                  <a:ext uri="{FF2B5EF4-FFF2-40B4-BE49-F238E27FC236}">
+                    <a16:creationId xmlns:a16="http://schemas.microsoft.com/office/drawing/2014/main" id="{BE197B3E-FA9B-4BF0-A1C0-B0114F36C125}"/>
+                  </a:ext>
+                </a:extLst>
+              </p:cNvPr>
+              <p:cNvSpPr/>
+              <p:nvPr/>
+            </p:nvSpPr>
+            <p:spPr>
+              <a:xfrm>
+                <a:off x="10574488" y="2696524"/>
+                <a:ext cx="1312712" cy="481965"/>
+              </a:xfrm>
+              <a:prstGeom prst="rect">
+                <a:avLst/>
+              </a:prstGeom>
               <a:solidFill>
                 <a:schemeClr val="tx2"/>
               </a:solidFill>
-              <a:tailEnd type="triangle"/>
-            </a:ln>
-          </p:spPr>
-          <p:style>
-            <a:lnRef idx="3">
-              <a:schemeClr val="dk1"/>
-            </a:lnRef>
-            <a:fillRef idx="0">
-              <a:schemeClr val="dk1"/>
-            </a:fillRef>
-            <a:effectRef idx="2">
-              <a:schemeClr val="dk1"/>
-            </a:effectRef>
-            <a:fontRef idx="minor">
-              <a:schemeClr val="tx1"/>
-            </a:fontRef>
-          </p:style>
-        </p:cxnSp>
-        <p:sp>
-          <p:nvSpPr>
-            <p:cNvPr id="25" name="Rectangle 24">
-              <a:extLst>
-                <a:ext uri="{FF2B5EF4-FFF2-40B4-BE49-F238E27FC236}">
-                  <a16:creationId xmlns:a16="http://schemas.microsoft.com/office/drawing/2014/main" id="{BE197B3E-FA9B-4BF0-A1C0-B0114F36C125}"/>
-                </a:ext>
-              </a:extLst>
-            </p:cNvPr>
-            <p:cNvSpPr/>
-            <p:nvPr/>
-          </p:nvSpPr>
-          <p:spPr>
-            <a:xfrm>
-              <a:off x="10574488" y="2696524"/>
-              <a:ext cx="1312712" cy="481965"/>
-            </a:xfrm>
-            <a:prstGeom prst="rect">
-              <a:avLst/>
-            </a:prstGeom>
-            <a:solidFill>
-              <a:schemeClr val="tx2"/>
-            </a:solidFill>
-            <a:ln>
-              <a:noFill/>
-            </a:ln>
-          </p:spPr>
-          <p:style>
-            <a:lnRef idx="2">
-              <a:schemeClr val="accent1">
-                <a:shade val="50000"/>
-              </a:schemeClr>
-            </a:lnRef>
-            <a:fillRef idx="1">
-              <a:schemeClr val="accent1"/>
-            </a:fillRef>
-            <a:effectRef idx="0">
-              <a:schemeClr val="accent1"/>
-            </a:effectRef>
-            <a:fontRef idx="minor">
-              <a:schemeClr val="lt1"/>
-            </a:fontRef>
-          </p:style>
-          <p:txBody>
-            <a:bodyPr rtlCol="0" anchor="ctr"/>
-            <a:lstStyle/>
-            <a:p>
-              <a:pPr algn="ctr"/>
-              <a:r>
-                <a:rPr lang="en-US" sz="1200" dirty="0"/>
-                <a:t>Budget set for the filtered month</a:t>
-              </a:r>
-              <a:endParaRPr lang="en-SG" sz="1200" dirty="0"/>
-            </a:p>
-          </p:txBody>
-        </p:sp>
-        <p:sp>
-          <p:nvSpPr>
-            <p:cNvPr id="26" name="Frame 25">
-              <a:extLst>
-                <a:ext uri="{FF2B5EF4-FFF2-40B4-BE49-F238E27FC236}">
-                  <a16:creationId xmlns:a16="http://schemas.microsoft.com/office/drawing/2014/main" id="{751DDA21-BF2D-4189-82DF-CC26EE9EE700}"/>
-                </a:ext>
-              </a:extLst>
-            </p:cNvPr>
-            <p:cNvSpPr/>
-            <p:nvPr/>
-          </p:nvSpPr>
-          <p:spPr>
-            <a:xfrm>
-              <a:off x="8839863" y="2815005"/>
-              <a:ext cx="1447802" cy="293936"/>
-            </a:xfrm>
-            <a:prstGeom prst="frame">
-              <a:avLst>
-                <a:gd name="adj1" fmla="val 5112"/>
-              </a:avLst>
-            </a:prstGeom>
-            <a:solidFill>
-              <a:srgbClr val="FC3737"/>
-            </a:solidFill>
-            <a:ln w="12700">
+              <a:ln>
+                <a:noFill/>
+              </a:ln>
+            </p:spPr>
+            <p:style>
+              <a:lnRef idx="2">
+                <a:schemeClr val="accent1">
+                  <a:shade val="50000"/>
+                </a:schemeClr>
+              </a:lnRef>
+              <a:fillRef idx="1">
+                <a:schemeClr val="accent1"/>
+              </a:fillRef>
+              <a:effectRef idx="0">
+                <a:schemeClr val="accent1"/>
+              </a:effectRef>
+              <a:fontRef idx="minor">
+                <a:schemeClr val="lt1"/>
+              </a:fontRef>
+            </p:style>
+            <p:txBody>
+              <a:bodyPr rtlCol="0" anchor="ctr"/>
+              <a:lstStyle/>
+              <a:p>
+                <a:pPr algn="ctr"/>
+                <a:r>
+                  <a:rPr lang="en-US" sz="1200" dirty="0"/>
+                  <a:t>Budget set for the filtered month</a:t>
+                </a:r>
+                <a:endParaRPr lang="en-SG" sz="1200" dirty="0"/>
+              </a:p>
+            </p:txBody>
+          </p:sp>
+          <p:sp>
+            <p:nvSpPr>
+              <p:cNvPr id="26" name="Frame 25">
+                <a:extLst>
+                  <a:ext uri="{FF2B5EF4-FFF2-40B4-BE49-F238E27FC236}">
+                    <a16:creationId xmlns:a16="http://schemas.microsoft.com/office/drawing/2014/main" id="{751DDA21-BF2D-4189-82DF-CC26EE9EE700}"/>
+                  </a:ext>
+                </a:extLst>
+              </p:cNvPr>
+              <p:cNvSpPr/>
+              <p:nvPr/>
+            </p:nvSpPr>
+            <p:spPr>
+              <a:xfrm>
+                <a:off x="8839863" y="2815005"/>
+                <a:ext cx="1447802" cy="293936"/>
+              </a:xfrm>
+              <a:prstGeom prst="frame">
+                <a:avLst>
+                  <a:gd name="adj1" fmla="val 5112"/>
+                </a:avLst>
+              </a:prstGeom>
               <a:solidFill>
-                <a:srgbClr val="FF0000"/>
+                <a:srgbClr val="FC3737"/>
               </a:solidFill>
-            </a:ln>
-          </p:spPr>
-          <p:style>
-            <a:lnRef idx="2">
-              <a:schemeClr val="accent1">
-                <a:shade val="50000"/>
-              </a:schemeClr>
-            </a:lnRef>
-            <a:fillRef idx="1">
-              <a:schemeClr val="accent1"/>
-            </a:fillRef>
-            <a:effectRef idx="0">
-              <a:schemeClr val="accent1"/>
-            </a:effectRef>
-            <a:fontRef idx="minor">
-              <a:schemeClr val="lt1"/>
-            </a:fontRef>
-          </p:style>
-          <p:txBody>
-            <a:bodyPr rtlCol="0" anchor="ctr"/>
-            <a:lstStyle/>
-            <a:p>
-              <a:pPr algn="ctr"/>
-              <a:endParaRPr lang="en-SG">
+              <a:ln w="12700">
                 <a:solidFill>
-                  <a:schemeClr val="tx1"/>
+                  <a:srgbClr val="FF0000"/>
                 </a:solidFill>
-              </a:endParaRPr>
-            </a:p>
-          </p:txBody>
-        </p:sp>
-        <p:sp>
-          <p:nvSpPr>
-            <p:cNvPr id="27" name="Frame 26">
-              <a:extLst>
-                <a:ext uri="{FF2B5EF4-FFF2-40B4-BE49-F238E27FC236}">
-                  <a16:creationId xmlns:a16="http://schemas.microsoft.com/office/drawing/2014/main" id="{9B345494-9696-4394-A205-A50B0D349E59}"/>
-                </a:ext>
-              </a:extLst>
-            </p:cNvPr>
-            <p:cNvSpPr/>
-            <p:nvPr/>
-          </p:nvSpPr>
-          <p:spPr>
-            <a:xfrm>
-              <a:off x="8839863" y="3214376"/>
-              <a:ext cx="1447802" cy="293936"/>
-            </a:xfrm>
-            <a:prstGeom prst="frame">
-              <a:avLst>
-                <a:gd name="adj1" fmla="val 5112"/>
-              </a:avLst>
-            </a:prstGeom>
-            <a:solidFill>
-              <a:srgbClr val="FC3737"/>
-            </a:solidFill>
-            <a:ln w="12700">
+              </a:ln>
+            </p:spPr>
+            <p:style>
+              <a:lnRef idx="2">
+                <a:schemeClr val="accent1">
+                  <a:shade val="50000"/>
+                </a:schemeClr>
+              </a:lnRef>
+              <a:fillRef idx="1">
+                <a:schemeClr val="accent1"/>
+              </a:fillRef>
+              <a:effectRef idx="0">
+                <a:schemeClr val="accent1"/>
+              </a:effectRef>
+              <a:fontRef idx="minor">
+                <a:schemeClr val="lt1"/>
+              </a:fontRef>
+            </p:style>
+            <p:txBody>
+              <a:bodyPr rtlCol="0" anchor="ctr"/>
+              <a:lstStyle/>
+              <a:p>
+                <a:pPr algn="ctr"/>
+                <a:endParaRPr lang="en-SG">
+                  <a:solidFill>
+                    <a:schemeClr val="tx1"/>
+                  </a:solidFill>
+                </a:endParaRPr>
+              </a:p>
+            </p:txBody>
+          </p:sp>
+          <p:sp>
+            <p:nvSpPr>
+              <p:cNvPr id="27" name="Frame 26">
+                <a:extLst>
+                  <a:ext uri="{FF2B5EF4-FFF2-40B4-BE49-F238E27FC236}">
+                    <a16:creationId xmlns:a16="http://schemas.microsoft.com/office/drawing/2014/main" id="{9B345494-9696-4394-A205-A50B0D349E59}"/>
+                  </a:ext>
+                </a:extLst>
+              </p:cNvPr>
+              <p:cNvSpPr/>
+              <p:nvPr/>
+            </p:nvSpPr>
+            <p:spPr>
+              <a:xfrm>
+                <a:off x="8671187" y="3214376"/>
+                <a:ext cx="1616478" cy="293936"/>
+              </a:xfrm>
+              <a:prstGeom prst="frame">
+                <a:avLst>
+                  <a:gd name="adj1" fmla="val 5112"/>
+                </a:avLst>
+              </a:prstGeom>
               <a:solidFill>
-                <a:srgbClr val="FF0000"/>
+                <a:srgbClr val="FC3737"/>
               </a:solidFill>
-            </a:ln>
-          </p:spPr>
-          <p:style>
-            <a:lnRef idx="2">
-              <a:schemeClr val="accent1">
-                <a:shade val="50000"/>
-              </a:schemeClr>
-            </a:lnRef>
-            <a:fillRef idx="1">
-              <a:schemeClr val="accent1"/>
-            </a:fillRef>
-            <a:effectRef idx="0">
-              <a:schemeClr val="accent1"/>
-            </a:effectRef>
-            <a:fontRef idx="minor">
-              <a:schemeClr val="lt1"/>
-            </a:fontRef>
-          </p:style>
-          <p:txBody>
-            <a:bodyPr rtlCol="0" anchor="ctr"/>
-            <a:lstStyle/>
-            <a:p>
-              <a:pPr algn="ctr"/>
-              <a:endParaRPr lang="en-SG">
+              <a:ln w="12700">
                 <a:solidFill>
-                  <a:schemeClr val="tx1"/>
+                  <a:srgbClr val="FF0000"/>
                 </a:solidFill>
-              </a:endParaRPr>
-            </a:p>
-          </p:txBody>
-        </p:sp>
-        <p:cxnSp>
-          <p:nvCxnSpPr>
-            <p:cNvPr id="28" name="Straight Arrow Connector 27">
-              <a:extLst>
-                <a:ext uri="{FF2B5EF4-FFF2-40B4-BE49-F238E27FC236}">
-                  <a16:creationId xmlns:a16="http://schemas.microsoft.com/office/drawing/2014/main" id="{839B92CE-31F4-4DC6-8BD4-EAA5F93C0CA7}"/>
-                </a:ext>
-              </a:extLst>
-            </p:cNvPr>
-            <p:cNvCxnSpPr>
-              <a:cxnSpLocks/>
-            </p:cNvCxnSpPr>
-            <p:nvPr/>
-          </p:nvCxnSpPr>
-          <p:spPr>
-            <a:xfrm>
-              <a:off x="8524872" y="3361344"/>
-              <a:ext cx="314991" cy="0"/>
-            </a:xfrm>
-            <a:prstGeom prst="straightConnector1">
-              <a:avLst/>
-            </a:prstGeom>
-            <a:ln>
+              </a:ln>
+            </p:spPr>
+            <p:style>
+              <a:lnRef idx="2">
+                <a:schemeClr val="accent1">
+                  <a:shade val="50000"/>
+                </a:schemeClr>
+              </a:lnRef>
+              <a:fillRef idx="1">
+                <a:schemeClr val="accent1"/>
+              </a:fillRef>
+              <a:effectRef idx="0">
+                <a:schemeClr val="accent1"/>
+              </a:effectRef>
+              <a:fontRef idx="minor">
+                <a:schemeClr val="lt1"/>
+              </a:fontRef>
+            </p:style>
+            <p:txBody>
+              <a:bodyPr rtlCol="0" anchor="ctr"/>
+              <a:lstStyle/>
+              <a:p>
+                <a:pPr algn="ctr"/>
+                <a:endParaRPr lang="en-SG">
+                  <a:solidFill>
+                    <a:schemeClr val="tx1"/>
+                  </a:solidFill>
+                </a:endParaRPr>
+              </a:p>
+            </p:txBody>
+          </p:sp>
+          <p:cxnSp>
+            <p:nvCxnSpPr>
+              <p:cNvPr id="28" name="Straight Arrow Connector 27">
+                <a:extLst>
+                  <a:ext uri="{FF2B5EF4-FFF2-40B4-BE49-F238E27FC236}">
+                    <a16:creationId xmlns:a16="http://schemas.microsoft.com/office/drawing/2014/main" id="{839B92CE-31F4-4DC6-8BD4-EAA5F93C0CA7}"/>
+                  </a:ext>
+                </a:extLst>
+              </p:cNvPr>
+              <p:cNvCxnSpPr>
+                <a:cxnSpLocks/>
+              </p:cNvCxnSpPr>
+              <p:nvPr/>
+            </p:nvCxnSpPr>
+            <p:spPr>
+              <a:xfrm>
+                <a:off x="8365074" y="3361344"/>
+                <a:ext cx="314991" cy="0"/>
+              </a:xfrm>
+              <a:prstGeom prst="straightConnector1">
+                <a:avLst/>
+              </a:prstGeom>
+              <a:ln>
+                <a:solidFill>
+                  <a:schemeClr val="tx2"/>
+                </a:solidFill>
+                <a:tailEnd type="triangle"/>
+              </a:ln>
+            </p:spPr>
+            <p:style>
+              <a:lnRef idx="3">
+                <a:schemeClr val="dk1"/>
+              </a:lnRef>
+              <a:fillRef idx="0">
+                <a:schemeClr val="dk1"/>
+              </a:fillRef>
+              <a:effectRef idx="2">
+                <a:schemeClr val="dk1"/>
+              </a:effectRef>
+              <a:fontRef idx="minor">
+                <a:schemeClr val="tx1"/>
+              </a:fontRef>
+            </p:style>
+          </p:cxnSp>
+          <p:sp>
+            <p:nvSpPr>
+              <p:cNvPr id="29" name="Rectangle 28">
+                <a:extLst>
+                  <a:ext uri="{FF2B5EF4-FFF2-40B4-BE49-F238E27FC236}">
+                    <a16:creationId xmlns:a16="http://schemas.microsoft.com/office/drawing/2014/main" id="{4A0CD603-EECE-4961-B946-6789422857DC}"/>
+                  </a:ext>
+                </a:extLst>
+              </p:cNvPr>
+              <p:cNvSpPr/>
+              <p:nvPr/>
+            </p:nvSpPr>
+            <p:spPr>
+              <a:xfrm>
+                <a:off x="6917271" y="3108941"/>
+                <a:ext cx="1447802" cy="440972"/>
+              </a:xfrm>
+              <a:prstGeom prst="rect">
+                <a:avLst/>
+              </a:prstGeom>
               <a:solidFill>
                 <a:schemeClr val="tx2"/>
               </a:solidFill>
-              <a:tailEnd type="triangle"/>
-            </a:ln>
-          </p:spPr>
-          <p:style>
-            <a:lnRef idx="3">
-              <a:schemeClr val="dk1"/>
-            </a:lnRef>
-            <a:fillRef idx="0">
-              <a:schemeClr val="dk1"/>
-            </a:fillRef>
-            <a:effectRef idx="2">
-              <a:schemeClr val="dk1"/>
-            </a:effectRef>
-            <a:fontRef idx="minor">
-              <a:schemeClr val="tx1"/>
-            </a:fontRef>
-          </p:style>
-        </p:cxnSp>
-        <p:sp>
-          <p:nvSpPr>
-            <p:cNvPr id="29" name="Rectangle 28">
-              <a:extLst>
-                <a:ext uri="{FF2B5EF4-FFF2-40B4-BE49-F238E27FC236}">
-                  <a16:creationId xmlns:a16="http://schemas.microsoft.com/office/drawing/2014/main" id="{4A0CD603-EECE-4961-B946-6789422857DC}"/>
-                </a:ext>
-              </a:extLst>
-            </p:cNvPr>
-            <p:cNvSpPr/>
-            <p:nvPr/>
-          </p:nvSpPr>
-          <p:spPr>
-            <a:xfrm>
-              <a:off x="7077069" y="3108941"/>
-              <a:ext cx="1447802" cy="440972"/>
-            </a:xfrm>
-            <a:prstGeom prst="rect">
-              <a:avLst/>
-            </a:prstGeom>
-            <a:solidFill>
-              <a:schemeClr val="tx2"/>
-            </a:solidFill>
-            <a:ln>
-              <a:noFill/>
-            </a:ln>
-          </p:spPr>
-          <p:style>
-            <a:lnRef idx="2">
-              <a:schemeClr val="accent1">
-                <a:shade val="50000"/>
-              </a:schemeClr>
-            </a:lnRef>
-            <a:fillRef idx="1">
-              <a:schemeClr val="accent1"/>
-            </a:fillRef>
-            <a:effectRef idx="0">
-              <a:schemeClr val="accent1"/>
-            </a:effectRef>
-            <a:fontRef idx="minor">
-              <a:schemeClr val="lt1"/>
-            </a:fontRef>
-          </p:style>
-          <p:txBody>
-            <a:bodyPr rtlCol="0" anchor="ctr"/>
-            <a:lstStyle/>
-            <a:p>
-              <a:pPr algn="ctr"/>
-              <a:r>
-                <a:rPr lang="en-US" sz="1200" dirty="0"/>
-                <a:t>Filter set for the list of transaction</a:t>
-              </a:r>
-              <a:endParaRPr lang="en-SG" sz="1200" dirty="0"/>
-            </a:p>
-          </p:txBody>
-        </p:sp>
+              <a:ln>
+                <a:noFill/>
+              </a:ln>
+            </p:spPr>
+            <p:style>
+              <a:lnRef idx="2">
+                <a:schemeClr val="accent1">
+                  <a:shade val="50000"/>
+                </a:schemeClr>
+              </a:lnRef>
+              <a:fillRef idx="1">
+                <a:schemeClr val="accent1"/>
+              </a:fillRef>
+              <a:effectRef idx="0">
+                <a:schemeClr val="accent1"/>
+              </a:effectRef>
+              <a:fontRef idx="minor">
+                <a:schemeClr val="lt1"/>
+              </a:fontRef>
+            </p:style>
+            <p:txBody>
+              <a:bodyPr rtlCol="0" anchor="ctr"/>
+              <a:lstStyle/>
+              <a:p>
+                <a:pPr algn="ctr"/>
+                <a:r>
+                  <a:rPr lang="en-US" sz="1200" dirty="0"/>
+                  <a:t>Filter set for the list of transaction</a:t>
+                </a:r>
+                <a:endParaRPr lang="en-SG" sz="1200" dirty="0"/>
+              </a:p>
+            </p:txBody>
+          </p:sp>
+        </p:grpSp>
       </p:grpSp>
     </p:spTree>
     <p:extLst>

</xml_diff>